<commit_message>
added more details in slides
</commit_message>
<xml_diff>
--- a/lectures/1. Introduction to audio coding.pptx
+++ b/lectures/1. Introduction to audio coding.pptx
@@ -5,20 +5,21 @@
     <p:sldMasterId id="2147483659" r:id="rId1"/>
   </p:sldMasterIdLst>
   <p:notesMasterIdLst>
-    <p:notesMasterId r:id="rId13"/>
+    <p:notesMasterId r:id="rId14"/>
   </p:notesMasterIdLst>
   <p:sldIdLst>
     <p:sldId id="256" r:id="rId2"/>
-    <p:sldId id="257" r:id="rId3"/>
-    <p:sldId id="258" r:id="rId4"/>
-    <p:sldId id="259" r:id="rId5"/>
-    <p:sldId id="260" r:id="rId6"/>
-    <p:sldId id="261" r:id="rId7"/>
-    <p:sldId id="262" r:id="rId8"/>
-    <p:sldId id="263" r:id="rId9"/>
-    <p:sldId id="264" r:id="rId10"/>
-    <p:sldId id="265" r:id="rId11"/>
-    <p:sldId id="266" r:id="rId12"/>
+    <p:sldId id="268" r:id="rId3"/>
+    <p:sldId id="257" r:id="rId4"/>
+    <p:sldId id="258" r:id="rId5"/>
+    <p:sldId id="259" r:id="rId6"/>
+    <p:sldId id="260" r:id="rId7"/>
+    <p:sldId id="261" r:id="rId8"/>
+    <p:sldId id="262" r:id="rId9"/>
+    <p:sldId id="263" r:id="rId10"/>
+    <p:sldId id="264" r:id="rId11"/>
+    <p:sldId id="265" r:id="rId12"/>
+    <p:sldId id="266" r:id="rId13"/>
   </p:sldIdLst>
   <p:sldSz cx="9144000" cy="5143500" type="screen16x9"/>
   <p:notesSz cx="6858000" cy="9144000"/>
@@ -740,8 +741,8 @@
         </p:nvSpPr>
         <p:spPr>
           <a:xfrm>
-            <a:off x="381300" y="685800"/>
-            <a:ext cx="6096075" cy="3429000"/>
+            <a:off x="381000" y="685800"/>
+            <a:ext cx="6096000" cy="3429000"/>
           </a:xfrm>
           <a:custGeom>
             <a:avLst/>
@@ -820,6 +821,110 @@
   <p:cSld>
     <p:spTree>
       <p:nvGrpSpPr>
+        <p:cNvPr id="1" name="Shape 101"/>
+        <p:cNvGrpSpPr/>
+        <p:nvPr/>
+      </p:nvGrpSpPr>
+      <p:grpSpPr>
+        <a:xfrm>
+          <a:off x="0" y="0"/>
+          <a:ext cx="0" cy="0"/>
+          <a:chOff x="0" y="0"/>
+          <a:chExt cx="0" cy="0"/>
+        </a:xfrm>
+      </p:grpSpPr>
+      <p:sp>
+        <p:nvSpPr>
+          <p:cNvPr id="102" name="Google Shape;102;g2f174202b4b_0_82:notes"/>
+          <p:cNvSpPr>
+            <a:spLocks noGrp="1" noRot="1" noChangeAspect="1"/>
+          </p:cNvSpPr>
+          <p:nvPr>
+            <p:ph type="sldImg" idx="2"/>
+          </p:nvPr>
+        </p:nvSpPr>
+        <p:spPr>
+          <a:xfrm>
+            <a:off x="381000" y="685800"/>
+            <a:ext cx="6096000" cy="3429000"/>
+          </a:xfrm>
+          <a:custGeom>
+            <a:avLst/>
+            <a:gdLst/>
+            <a:ahLst/>
+            <a:cxnLst/>
+            <a:rect l="l" t="t" r="r" b="b"/>
+            <a:pathLst>
+              <a:path w="120000" h="120000" extrusionOk="0">
+                <a:moveTo>
+                  <a:pt x="0" y="0"/>
+                </a:moveTo>
+                <a:lnTo>
+                  <a:pt x="120000" y="0"/>
+                </a:lnTo>
+                <a:lnTo>
+                  <a:pt x="120000" y="120000"/>
+                </a:lnTo>
+                <a:lnTo>
+                  <a:pt x="0" y="120000"/>
+                </a:lnTo>
+                <a:close/>
+              </a:path>
+            </a:pathLst>
+          </a:custGeom>
+        </p:spPr>
+      </p:sp>
+      <p:sp>
+        <p:nvSpPr>
+          <p:cNvPr id="103" name="Google Shape;103;g2f174202b4b_0_82:notes"/>
+          <p:cNvSpPr txBox="1">
+            <a:spLocks noGrp="1"/>
+          </p:cNvSpPr>
+          <p:nvPr>
+            <p:ph type="body" idx="1"/>
+          </p:nvPr>
+        </p:nvSpPr>
+        <p:spPr>
+          <a:xfrm>
+            <a:off x="685800" y="4343400"/>
+            <a:ext cx="5486400" cy="4114800"/>
+          </a:xfrm>
+          <a:prstGeom prst="rect">
+            <a:avLst/>
+          </a:prstGeom>
+        </p:spPr>
+        <p:txBody>
+          <a:bodyPr spcFirstLastPara="1" wrap="square" lIns="91425" tIns="91425" rIns="91425" bIns="91425" anchor="t" anchorCtr="0">
+            <a:noAutofit/>
+          </a:bodyPr>
+          <a:lstStyle/>
+          <a:p>
+            <a:pPr marL="0" lvl="0" indent="0" algn="l" rtl="0">
+              <a:spcBef>
+                <a:spcPts val="0"/>
+              </a:spcBef>
+              <a:spcAft>
+                <a:spcPts val="0"/>
+              </a:spcAft>
+              <a:buNone/>
+            </a:pPr>
+            <a:endParaRPr/>
+          </a:p>
+        </p:txBody>
+      </p:sp>
+    </p:spTree>
+  </p:cSld>
+  <p:clrMapOvr>
+    <a:masterClrMapping/>
+  </p:clrMapOvr>
+</p:notes>
+</file>
+
+<file path=ppt/notesSlides/notesSlide11.xml><?xml version="1.0" encoding="utf-8"?>
+<p:notes xmlns:a="http://schemas.openxmlformats.org/drawingml/2006/main" xmlns:r="http://schemas.openxmlformats.org/officeDocument/2006/relationships" xmlns:p="http://schemas.openxmlformats.org/presentationml/2006/main" showMasterSp="0" showMasterPhAnim="0">
+  <p:cSld>
+    <p:spTree>
+      <p:nvGrpSpPr>
         <p:cNvPr id="1" name="Shape 107"/>
         <p:cNvGrpSpPr/>
         <p:nvPr/>
@@ -844,7 +949,7 @@
         </p:nvSpPr>
         <p:spPr>
           <a:xfrm>
-            <a:off x="381300" y="685800"/>
+            <a:off x="381000" y="685800"/>
             <a:ext cx="6096000" cy="3429000"/>
           </a:xfrm>
           <a:custGeom>
@@ -924,6 +1029,133 @@
   <p:cSld>
     <p:spTree>
       <p:nvGrpSpPr>
+        <p:cNvPr id="1" name="Shape 56">
+          <a:extLst>
+            <a:ext uri="{FF2B5EF4-FFF2-40B4-BE49-F238E27FC236}">
+              <a16:creationId xmlns:a16="http://schemas.microsoft.com/office/drawing/2014/main" id="{8F200D45-A4F5-826A-8962-1B63E71BECED}"/>
+            </a:ext>
+          </a:extLst>
+        </p:cNvPr>
+        <p:cNvGrpSpPr/>
+        <p:nvPr/>
+      </p:nvGrpSpPr>
+      <p:grpSpPr>
+        <a:xfrm>
+          <a:off x="0" y="0"/>
+          <a:ext cx="0" cy="0"/>
+          <a:chOff x="0" y="0"/>
+          <a:chExt cx="0" cy="0"/>
+        </a:xfrm>
+      </p:grpSpPr>
+      <p:sp>
+        <p:nvSpPr>
+          <p:cNvPr id="57" name="Google Shape;57;g2f174202b4b_0_0:notes">
+            <a:extLst>
+              <a:ext uri="{FF2B5EF4-FFF2-40B4-BE49-F238E27FC236}">
+                <a16:creationId xmlns:a16="http://schemas.microsoft.com/office/drawing/2014/main" id="{2B45C13D-26F9-A139-34E7-26F944F654DA}"/>
+              </a:ext>
+            </a:extLst>
+          </p:cNvPr>
+          <p:cNvSpPr>
+            <a:spLocks noGrp="1" noRot="1" noChangeAspect="1"/>
+          </p:cNvSpPr>
+          <p:nvPr>
+            <p:ph type="sldImg" idx="2"/>
+          </p:nvPr>
+        </p:nvSpPr>
+        <p:spPr>
+          <a:xfrm>
+            <a:off x="381000" y="685800"/>
+            <a:ext cx="6096000" cy="3429000"/>
+          </a:xfrm>
+          <a:custGeom>
+            <a:avLst/>
+            <a:gdLst/>
+            <a:ahLst/>
+            <a:cxnLst/>
+            <a:rect l="l" t="t" r="r" b="b"/>
+            <a:pathLst>
+              <a:path w="120000" h="120000" extrusionOk="0">
+                <a:moveTo>
+                  <a:pt x="0" y="0"/>
+                </a:moveTo>
+                <a:lnTo>
+                  <a:pt x="120000" y="0"/>
+                </a:lnTo>
+                <a:lnTo>
+                  <a:pt x="120000" y="120000"/>
+                </a:lnTo>
+                <a:lnTo>
+                  <a:pt x="0" y="120000"/>
+                </a:lnTo>
+                <a:close/>
+              </a:path>
+            </a:pathLst>
+          </a:custGeom>
+        </p:spPr>
+      </p:sp>
+      <p:sp>
+        <p:nvSpPr>
+          <p:cNvPr id="58" name="Google Shape;58;g2f174202b4b_0_0:notes">
+            <a:extLst>
+              <a:ext uri="{FF2B5EF4-FFF2-40B4-BE49-F238E27FC236}">
+                <a16:creationId xmlns:a16="http://schemas.microsoft.com/office/drawing/2014/main" id="{A291FE92-65AA-9CC6-D39D-7D7355CC4803}"/>
+              </a:ext>
+            </a:extLst>
+          </p:cNvPr>
+          <p:cNvSpPr txBox="1">
+            <a:spLocks noGrp="1"/>
+          </p:cNvSpPr>
+          <p:nvPr>
+            <p:ph type="body" idx="1"/>
+          </p:nvPr>
+        </p:nvSpPr>
+        <p:spPr>
+          <a:xfrm>
+            <a:off x="685800" y="4343400"/>
+            <a:ext cx="5486400" cy="4114800"/>
+          </a:xfrm>
+          <a:prstGeom prst="rect">
+            <a:avLst/>
+          </a:prstGeom>
+        </p:spPr>
+        <p:txBody>
+          <a:bodyPr spcFirstLastPara="1" wrap="square" lIns="91425" tIns="91425" rIns="91425" bIns="91425" anchor="t" anchorCtr="0">
+            <a:noAutofit/>
+          </a:bodyPr>
+          <a:lstStyle/>
+          <a:p>
+            <a:pPr marL="0" lvl="0" indent="0" algn="l" rtl="0">
+              <a:spcBef>
+                <a:spcPts val="0"/>
+              </a:spcBef>
+              <a:spcAft>
+                <a:spcPts val="0"/>
+              </a:spcAft>
+              <a:buNone/>
+            </a:pPr>
+            <a:endParaRPr/>
+          </a:p>
+        </p:txBody>
+      </p:sp>
+    </p:spTree>
+    <p:extLst>
+      <p:ext uri="{BB962C8B-B14F-4D97-AF65-F5344CB8AC3E}">
+        <p14:creationId xmlns:p14="http://schemas.microsoft.com/office/powerpoint/2010/main" val="322939205"/>
+      </p:ext>
+    </p:extLst>
+  </p:cSld>
+  <p:clrMapOvr>
+    <a:masterClrMapping/>
+  </p:clrMapOvr>
+</p:notes>
+</file>
+
+<file path=ppt/notesSlides/notesSlide3.xml><?xml version="1.0" encoding="utf-8"?>
+<p:notes xmlns:a="http://schemas.openxmlformats.org/drawingml/2006/main" xmlns:r="http://schemas.openxmlformats.org/officeDocument/2006/relationships" xmlns:p="http://schemas.openxmlformats.org/presentationml/2006/main" showMasterSp="0" showMasterPhAnim="0">
+  <p:cSld>
+    <p:spTree>
+      <p:nvGrpSpPr>
         <p:cNvPr id="1" name="Shape 56"/>
         <p:cNvGrpSpPr/>
         <p:nvPr/>
@@ -948,7 +1180,7 @@
         </p:nvSpPr>
         <p:spPr>
           <a:xfrm>
-            <a:off x="381300" y="685800"/>
+            <a:off x="381000" y="685800"/>
             <a:ext cx="6096000" cy="3429000"/>
           </a:xfrm>
           <a:custGeom>
@@ -1023,7 +1255,7 @@
 </p:notes>
 </file>
 
-<file path=ppt/notesSlides/notesSlide3.xml><?xml version="1.0" encoding="utf-8"?>
+<file path=ppt/notesSlides/notesSlide4.xml><?xml version="1.0" encoding="utf-8"?>
 <p:notes xmlns:a="http://schemas.openxmlformats.org/drawingml/2006/main" xmlns:r="http://schemas.openxmlformats.org/officeDocument/2006/relationships" xmlns:p="http://schemas.openxmlformats.org/presentationml/2006/main" showMasterSp="0" showMasterPhAnim="0">
   <p:cSld>
     <p:spTree>
@@ -1127,7 +1359,7 @@
 </p:notes>
 </file>
 
-<file path=ppt/notesSlides/notesSlide4.xml><?xml version="1.0" encoding="utf-8"?>
+<file path=ppt/notesSlides/notesSlide5.xml><?xml version="1.0" encoding="utf-8"?>
 <p:notes xmlns:a="http://schemas.openxmlformats.org/drawingml/2006/main" xmlns:r="http://schemas.openxmlformats.org/officeDocument/2006/relationships" xmlns:p="http://schemas.openxmlformats.org/presentationml/2006/main" showMasterSp="0" showMasterPhAnim="0">
   <p:cSld>
     <p:spTree>
@@ -1231,7 +1463,7 @@
 </p:notes>
 </file>
 
-<file path=ppt/notesSlides/notesSlide5.xml><?xml version="1.0" encoding="utf-8"?>
+<file path=ppt/notesSlides/notesSlide6.xml><?xml version="1.0" encoding="utf-8"?>
 <p:notes xmlns:a="http://schemas.openxmlformats.org/drawingml/2006/main" xmlns:r="http://schemas.openxmlformats.org/officeDocument/2006/relationships" xmlns:p="http://schemas.openxmlformats.org/presentationml/2006/main" showMasterSp="0" showMasterPhAnim="0">
   <p:cSld>
     <p:spTree>
@@ -1335,7 +1567,7 @@
 </p:notes>
 </file>
 
-<file path=ppt/notesSlides/notesSlide6.xml><?xml version="1.0" encoding="utf-8"?>
+<file path=ppt/notesSlides/notesSlide7.xml><?xml version="1.0" encoding="utf-8"?>
 <p:notes xmlns:a="http://schemas.openxmlformats.org/drawingml/2006/main" xmlns:r="http://schemas.openxmlformats.org/officeDocument/2006/relationships" xmlns:p="http://schemas.openxmlformats.org/presentationml/2006/main" showMasterSp="0" showMasterPhAnim="0">
   <p:cSld>
     <p:spTree>
@@ -1439,7 +1671,7 @@
 </p:notes>
 </file>
 
-<file path=ppt/notesSlides/notesSlide7.xml><?xml version="1.0" encoding="utf-8"?>
+<file path=ppt/notesSlides/notesSlide8.xml><?xml version="1.0" encoding="utf-8"?>
 <p:notes xmlns:a="http://schemas.openxmlformats.org/drawingml/2006/main" xmlns:r="http://schemas.openxmlformats.org/officeDocument/2006/relationships" xmlns:p="http://schemas.openxmlformats.org/presentationml/2006/main" showMasterSp="0" showMasterPhAnim="0">
   <p:cSld>
     <p:spTree>
@@ -1543,7 +1775,7 @@
 </p:notes>
 </file>
 
-<file path=ppt/notesSlides/notesSlide8.xml><?xml version="1.0" encoding="utf-8"?>
+<file path=ppt/notesSlides/notesSlide9.xml><?xml version="1.0" encoding="utf-8"?>
 <p:notes xmlns:a="http://schemas.openxmlformats.org/drawingml/2006/main" xmlns:r="http://schemas.openxmlformats.org/officeDocument/2006/relationships" xmlns:p="http://schemas.openxmlformats.org/presentationml/2006/main" showMasterSp="0" showMasterPhAnim="0">
   <p:cSld>
     <p:spTree>
@@ -1647,110 +1879,6 @@
 </p:notes>
 </file>
 
-<file path=ppt/notesSlides/notesSlide9.xml><?xml version="1.0" encoding="utf-8"?>
-<p:notes xmlns:a="http://schemas.openxmlformats.org/drawingml/2006/main" xmlns:r="http://schemas.openxmlformats.org/officeDocument/2006/relationships" xmlns:p="http://schemas.openxmlformats.org/presentationml/2006/main" showMasterSp="0" showMasterPhAnim="0">
-  <p:cSld>
-    <p:spTree>
-      <p:nvGrpSpPr>
-        <p:cNvPr id="1" name="Shape 101"/>
-        <p:cNvGrpSpPr/>
-        <p:nvPr/>
-      </p:nvGrpSpPr>
-      <p:grpSpPr>
-        <a:xfrm>
-          <a:off x="0" y="0"/>
-          <a:ext cx="0" cy="0"/>
-          <a:chOff x="0" y="0"/>
-          <a:chExt cx="0" cy="0"/>
-        </a:xfrm>
-      </p:grpSpPr>
-      <p:sp>
-        <p:nvSpPr>
-          <p:cNvPr id="102" name="Google Shape;102;g2f174202b4b_0_82:notes"/>
-          <p:cNvSpPr>
-            <a:spLocks noGrp="1" noRot="1" noChangeAspect="1"/>
-          </p:cNvSpPr>
-          <p:nvPr>
-            <p:ph type="sldImg" idx="2"/>
-          </p:nvPr>
-        </p:nvSpPr>
-        <p:spPr>
-          <a:xfrm>
-            <a:off x="381300" y="685800"/>
-            <a:ext cx="6096000" cy="3429000"/>
-          </a:xfrm>
-          <a:custGeom>
-            <a:avLst/>
-            <a:gdLst/>
-            <a:ahLst/>
-            <a:cxnLst/>
-            <a:rect l="l" t="t" r="r" b="b"/>
-            <a:pathLst>
-              <a:path w="120000" h="120000" extrusionOk="0">
-                <a:moveTo>
-                  <a:pt x="0" y="0"/>
-                </a:moveTo>
-                <a:lnTo>
-                  <a:pt x="120000" y="0"/>
-                </a:lnTo>
-                <a:lnTo>
-                  <a:pt x="120000" y="120000"/>
-                </a:lnTo>
-                <a:lnTo>
-                  <a:pt x="0" y="120000"/>
-                </a:lnTo>
-                <a:close/>
-              </a:path>
-            </a:pathLst>
-          </a:custGeom>
-        </p:spPr>
-      </p:sp>
-      <p:sp>
-        <p:nvSpPr>
-          <p:cNvPr id="103" name="Google Shape;103;g2f174202b4b_0_82:notes"/>
-          <p:cNvSpPr txBox="1">
-            <a:spLocks noGrp="1"/>
-          </p:cNvSpPr>
-          <p:nvPr>
-            <p:ph type="body" idx="1"/>
-          </p:nvPr>
-        </p:nvSpPr>
-        <p:spPr>
-          <a:xfrm>
-            <a:off x="685800" y="4343400"/>
-            <a:ext cx="5486400" cy="4114800"/>
-          </a:xfrm>
-          <a:prstGeom prst="rect">
-            <a:avLst/>
-          </a:prstGeom>
-        </p:spPr>
-        <p:txBody>
-          <a:bodyPr spcFirstLastPara="1" wrap="square" lIns="91425" tIns="91425" rIns="91425" bIns="91425" anchor="t" anchorCtr="0">
-            <a:noAutofit/>
-          </a:bodyPr>
-          <a:lstStyle/>
-          <a:p>
-            <a:pPr marL="0" lvl="0" indent="0" algn="l" rtl="0">
-              <a:spcBef>
-                <a:spcPts val="0"/>
-              </a:spcBef>
-              <a:spcAft>
-                <a:spcPts val="0"/>
-              </a:spcAft>
-              <a:buNone/>
-            </a:pPr>
-            <a:endParaRPr/>
-          </a:p>
-        </p:txBody>
-      </p:sp>
-    </p:spTree>
-  </p:cSld>
-  <p:clrMapOvr>
-    <a:masterClrMapping/>
-  </p:clrMapOvr>
-</p:notes>
-</file>
-
 <file path=ppt/slideLayouts/slideLayout1.xml><?xml version="1.0" encoding="utf-8"?>
 <p:sldLayout xmlns:a="http://schemas.openxmlformats.org/drawingml/2006/main" xmlns:r="http://schemas.openxmlformats.org/officeDocument/2006/relationships" xmlns:p="http://schemas.openxmlformats.org/presentationml/2006/main" matchingName="Title slide" type="title">
   <p:cSld name="TITLE">
@@ -2141,370 +2269,6 @@
 </file>
 
 <file path=ppt/slideLayouts/slideLayout10.xml><?xml version="1.0" encoding="utf-8"?>
-<p:sldLayout xmlns:a="http://schemas.openxmlformats.org/drawingml/2006/main" xmlns:r="http://schemas.openxmlformats.org/officeDocument/2006/relationships" xmlns:p="http://schemas.openxmlformats.org/presentationml/2006/main" matchingName="Big number">
-  <p:cSld name="BIG_NUMBER">
-    <p:spTree>
-      <p:nvGrpSpPr>
-        <p:cNvPr id="1" name="Shape 44"/>
-        <p:cNvGrpSpPr/>
-        <p:nvPr/>
-      </p:nvGrpSpPr>
-      <p:grpSpPr>
-        <a:xfrm>
-          <a:off x="0" y="0"/>
-          <a:ext cx="0" cy="0"/>
-          <a:chOff x="0" y="0"/>
-          <a:chExt cx="0" cy="0"/>
-        </a:xfrm>
-      </p:grpSpPr>
-      <p:sp>
-        <p:nvSpPr>
-          <p:cNvPr id="45" name="Google Shape;45;p11"/>
-          <p:cNvSpPr txBox="1">
-            <a:spLocks noGrp="1"/>
-          </p:cNvSpPr>
-          <p:nvPr>
-            <p:ph type="title" hasCustomPrompt="1"/>
-          </p:nvPr>
-        </p:nvSpPr>
-        <p:spPr>
-          <a:xfrm>
-            <a:off x="311700" y="1106125"/>
-            <a:ext cx="8520600" cy="1963500"/>
-          </a:xfrm>
-          <a:prstGeom prst="rect">
-            <a:avLst/>
-          </a:prstGeom>
-        </p:spPr>
-        <p:txBody>
-          <a:bodyPr spcFirstLastPara="1" wrap="square" lIns="91425" tIns="91425" rIns="91425" bIns="91425" anchor="b" anchorCtr="0">
-            <a:normAutofit/>
-          </a:bodyPr>
-          <a:lstStyle>
-            <a:lvl1pPr lvl="0" algn="ctr">
-              <a:spcBef>
-                <a:spcPts val="0"/>
-              </a:spcBef>
-              <a:spcAft>
-                <a:spcPts val="0"/>
-              </a:spcAft>
-              <a:buSzPts val="12000"/>
-              <a:buNone/>
-              <a:defRPr sz="12000"/>
-            </a:lvl1pPr>
-            <a:lvl2pPr lvl="1" algn="ctr">
-              <a:spcBef>
-                <a:spcPts val="0"/>
-              </a:spcBef>
-              <a:spcAft>
-                <a:spcPts val="0"/>
-              </a:spcAft>
-              <a:buSzPts val="12000"/>
-              <a:buNone/>
-              <a:defRPr sz="12000"/>
-            </a:lvl2pPr>
-            <a:lvl3pPr lvl="2" algn="ctr">
-              <a:spcBef>
-                <a:spcPts val="0"/>
-              </a:spcBef>
-              <a:spcAft>
-                <a:spcPts val="0"/>
-              </a:spcAft>
-              <a:buSzPts val="12000"/>
-              <a:buNone/>
-              <a:defRPr sz="12000"/>
-            </a:lvl3pPr>
-            <a:lvl4pPr lvl="3" algn="ctr">
-              <a:spcBef>
-                <a:spcPts val="0"/>
-              </a:spcBef>
-              <a:spcAft>
-                <a:spcPts val="0"/>
-              </a:spcAft>
-              <a:buSzPts val="12000"/>
-              <a:buNone/>
-              <a:defRPr sz="12000"/>
-            </a:lvl4pPr>
-            <a:lvl5pPr lvl="4" algn="ctr">
-              <a:spcBef>
-                <a:spcPts val="0"/>
-              </a:spcBef>
-              <a:spcAft>
-                <a:spcPts val="0"/>
-              </a:spcAft>
-              <a:buSzPts val="12000"/>
-              <a:buNone/>
-              <a:defRPr sz="12000"/>
-            </a:lvl5pPr>
-            <a:lvl6pPr lvl="5" algn="ctr">
-              <a:spcBef>
-                <a:spcPts val="0"/>
-              </a:spcBef>
-              <a:spcAft>
-                <a:spcPts val="0"/>
-              </a:spcAft>
-              <a:buSzPts val="12000"/>
-              <a:buNone/>
-              <a:defRPr sz="12000"/>
-            </a:lvl6pPr>
-            <a:lvl7pPr lvl="6" algn="ctr">
-              <a:spcBef>
-                <a:spcPts val="0"/>
-              </a:spcBef>
-              <a:spcAft>
-                <a:spcPts val="0"/>
-              </a:spcAft>
-              <a:buSzPts val="12000"/>
-              <a:buNone/>
-              <a:defRPr sz="12000"/>
-            </a:lvl7pPr>
-            <a:lvl8pPr lvl="7" algn="ctr">
-              <a:spcBef>
-                <a:spcPts val="0"/>
-              </a:spcBef>
-              <a:spcAft>
-                <a:spcPts val="0"/>
-              </a:spcAft>
-              <a:buSzPts val="12000"/>
-              <a:buNone/>
-              <a:defRPr sz="12000"/>
-            </a:lvl8pPr>
-            <a:lvl9pPr lvl="8" algn="ctr">
-              <a:spcBef>
-                <a:spcPts val="0"/>
-              </a:spcBef>
-              <a:spcAft>
-                <a:spcPts val="0"/>
-              </a:spcAft>
-              <a:buSzPts val="12000"/>
-              <a:buNone/>
-              <a:defRPr sz="12000"/>
-            </a:lvl9pPr>
-          </a:lstStyle>
-          <a:p>
-            <a:r>
-              <a:t>xx%</a:t>
-            </a:r>
-          </a:p>
-        </p:txBody>
-      </p:sp>
-      <p:sp>
-        <p:nvSpPr>
-          <p:cNvPr id="46" name="Google Shape;46;p11"/>
-          <p:cNvSpPr txBox="1">
-            <a:spLocks noGrp="1"/>
-          </p:cNvSpPr>
-          <p:nvPr>
-            <p:ph type="body" idx="1"/>
-          </p:nvPr>
-        </p:nvSpPr>
-        <p:spPr>
-          <a:xfrm>
-            <a:off x="311700" y="3152225"/>
-            <a:ext cx="8520600" cy="1300800"/>
-          </a:xfrm>
-          <a:prstGeom prst="rect">
-            <a:avLst/>
-          </a:prstGeom>
-        </p:spPr>
-        <p:txBody>
-          <a:bodyPr spcFirstLastPara="1" wrap="square" lIns="91425" tIns="91425" rIns="91425" bIns="91425" anchor="t" anchorCtr="0">
-            <a:normAutofit/>
-          </a:bodyPr>
-          <a:lstStyle>
-            <a:lvl1pPr marL="457200" lvl="0" indent="-342900" algn="ctr">
-              <a:spcBef>
-                <a:spcPts val="0"/>
-              </a:spcBef>
-              <a:spcAft>
-                <a:spcPts val="0"/>
-              </a:spcAft>
-              <a:buSzPts val="1800"/>
-              <a:buChar char="●"/>
-              <a:defRPr/>
-            </a:lvl1pPr>
-            <a:lvl2pPr marL="914400" lvl="1" indent="-317500" algn="ctr">
-              <a:spcBef>
-                <a:spcPts val="0"/>
-              </a:spcBef>
-              <a:spcAft>
-                <a:spcPts val="0"/>
-              </a:spcAft>
-              <a:buSzPts val="1400"/>
-              <a:buChar char="○"/>
-              <a:defRPr/>
-            </a:lvl2pPr>
-            <a:lvl3pPr marL="1371600" lvl="2" indent="-317500" algn="ctr">
-              <a:spcBef>
-                <a:spcPts val="0"/>
-              </a:spcBef>
-              <a:spcAft>
-                <a:spcPts val="0"/>
-              </a:spcAft>
-              <a:buSzPts val="1400"/>
-              <a:buChar char="■"/>
-              <a:defRPr/>
-            </a:lvl3pPr>
-            <a:lvl4pPr marL="1828800" lvl="3" indent="-317500" algn="ctr">
-              <a:spcBef>
-                <a:spcPts val="0"/>
-              </a:spcBef>
-              <a:spcAft>
-                <a:spcPts val="0"/>
-              </a:spcAft>
-              <a:buSzPts val="1400"/>
-              <a:buChar char="●"/>
-              <a:defRPr/>
-            </a:lvl4pPr>
-            <a:lvl5pPr marL="2286000" lvl="4" indent="-317500" algn="ctr">
-              <a:spcBef>
-                <a:spcPts val="0"/>
-              </a:spcBef>
-              <a:spcAft>
-                <a:spcPts val="0"/>
-              </a:spcAft>
-              <a:buSzPts val="1400"/>
-              <a:buChar char="○"/>
-              <a:defRPr/>
-            </a:lvl5pPr>
-            <a:lvl6pPr marL="2743200" lvl="5" indent="-317500" algn="ctr">
-              <a:spcBef>
-                <a:spcPts val="0"/>
-              </a:spcBef>
-              <a:spcAft>
-                <a:spcPts val="0"/>
-              </a:spcAft>
-              <a:buSzPts val="1400"/>
-              <a:buChar char="■"/>
-              <a:defRPr/>
-            </a:lvl6pPr>
-            <a:lvl7pPr marL="3200400" lvl="6" indent="-317500" algn="ctr">
-              <a:spcBef>
-                <a:spcPts val="0"/>
-              </a:spcBef>
-              <a:spcAft>
-                <a:spcPts val="0"/>
-              </a:spcAft>
-              <a:buSzPts val="1400"/>
-              <a:buChar char="●"/>
-              <a:defRPr/>
-            </a:lvl7pPr>
-            <a:lvl8pPr marL="3657600" lvl="7" indent="-317500" algn="ctr">
-              <a:spcBef>
-                <a:spcPts val="0"/>
-              </a:spcBef>
-              <a:spcAft>
-                <a:spcPts val="0"/>
-              </a:spcAft>
-              <a:buSzPts val="1400"/>
-              <a:buChar char="○"/>
-              <a:defRPr/>
-            </a:lvl8pPr>
-            <a:lvl9pPr marL="4114800" lvl="8" indent="-317500" algn="ctr">
-              <a:spcBef>
-                <a:spcPts val="0"/>
-              </a:spcBef>
-              <a:spcAft>
-                <a:spcPts val="0"/>
-              </a:spcAft>
-              <a:buSzPts val="1400"/>
-              <a:buChar char="■"/>
-              <a:defRPr/>
-            </a:lvl9pPr>
-          </a:lstStyle>
-          <a:p>
-            <a:endParaRPr/>
-          </a:p>
-        </p:txBody>
-      </p:sp>
-      <p:sp>
-        <p:nvSpPr>
-          <p:cNvPr id="47" name="Google Shape;47;p11"/>
-          <p:cNvSpPr txBox="1">
-            <a:spLocks noGrp="1"/>
-          </p:cNvSpPr>
-          <p:nvPr>
-            <p:ph type="sldNum" idx="12"/>
-          </p:nvPr>
-        </p:nvSpPr>
-        <p:spPr>
-          <a:xfrm>
-            <a:off x="8472458" y="4663217"/>
-            <a:ext cx="548700" cy="393600"/>
-          </a:xfrm>
-          <a:prstGeom prst="rect">
-            <a:avLst/>
-          </a:prstGeom>
-        </p:spPr>
-        <p:txBody>
-          <a:bodyPr spcFirstLastPara="1" wrap="square" lIns="91425" tIns="91425" rIns="91425" bIns="91425" anchor="ctr" anchorCtr="0">
-            <a:normAutofit/>
-          </a:bodyPr>
-          <a:lstStyle>
-            <a:lvl1pPr lvl="0">
-              <a:buNone/>
-              <a:defRPr/>
-            </a:lvl1pPr>
-            <a:lvl2pPr lvl="1">
-              <a:buNone/>
-              <a:defRPr/>
-            </a:lvl2pPr>
-            <a:lvl3pPr lvl="2">
-              <a:buNone/>
-              <a:defRPr/>
-            </a:lvl3pPr>
-            <a:lvl4pPr lvl="3">
-              <a:buNone/>
-              <a:defRPr/>
-            </a:lvl4pPr>
-            <a:lvl5pPr lvl="4">
-              <a:buNone/>
-              <a:defRPr/>
-            </a:lvl5pPr>
-            <a:lvl6pPr lvl="5">
-              <a:buNone/>
-              <a:defRPr/>
-            </a:lvl6pPr>
-            <a:lvl7pPr lvl="6">
-              <a:buNone/>
-              <a:defRPr/>
-            </a:lvl7pPr>
-            <a:lvl8pPr lvl="7">
-              <a:buNone/>
-              <a:defRPr/>
-            </a:lvl8pPr>
-            <a:lvl9pPr lvl="8">
-              <a:buNone/>
-              <a:defRPr/>
-            </a:lvl9pPr>
-          </a:lstStyle>
-          <a:p>
-            <a:pPr marL="0" lvl="0" indent="0" algn="r" rtl="0">
-              <a:spcBef>
-                <a:spcPts val="0"/>
-              </a:spcBef>
-              <a:spcAft>
-                <a:spcPts val="0"/>
-              </a:spcAft>
-              <a:buNone/>
-            </a:pPr>
-            <a:fld id="{00000000-1234-1234-1234-123412341234}" type="slidenum">
-              <a:rPr lang="en"/>
-              <a:t>‹#›</a:t>
-            </a:fld>
-            <a:endParaRPr/>
-          </a:p>
-        </p:txBody>
-      </p:sp>
-    </p:spTree>
-  </p:cSld>
-  <p:clrMapOvr>
-    <a:masterClrMapping/>
-  </p:clrMapOvr>
-</p:sldLayout>
-</file>
-
-<file path=ppt/slideLayouts/slideLayout11.xml><?xml version="1.0" encoding="utf-8"?>
 <p:sldLayout xmlns:a="http://schemas.openxmlformats.org/drawingml/2006/main" xmlns:r="http://schemas.openxmlformats.org/officeDocument/2006/relationships" xmlns:p="http://schemas.openxmlformats.org/presentationml/2006/main" matchingName="Blank" type="blank">
   <p:cSld name="BLANK">
     <p:spTree>
@@ -2609,239 +2373,6 @@
 </file>
 
 <file path=ppt/slideLayouts/slideLayout2.xml><?xml version="1.0" encoding="utf-8"?>
-<p:sldLayout xmlns:a="http://schemas.openxmlformats.org/drawingml/2006/main" xmlns:r="http://schemas.openxmlformats.org/officeDocument/2006/relationships" xmlns:p="http://schemas.openxmlformats.org/presentationml/2006/main" matchingName="Section header" type="secHead">
-  <p:cSld name="SECTION_HEADER">
-    <p:spTree>
-      <p:nvGrpSpPr>
-        <p:cNvPr id="1" name="Shape 13"/>
-        <p:cNvGrpSpPr/>
-        <p:nvPr/>
-      </p:nvGrpSpPr>
-      <p:grpSpPr>
-        <a:xfrm>
-          <a:off x="0" y="0"/>
-          <a:ext cx="0" cy="0"/>
-          <a:chOff x="0" y="0"/>
-          <a:chExt cx="0" cy="0"/>
-        </a:xfrm>
-      </p:grpSpPr>
-      <p:sp>
-        <p:nvSpPr>
-          <p:cNvPr id="14" name="Google Shape;14;p3"/>
-          <p:cNvSpPr txBox="1">
-            <a:spLocks noGrp="1"/>
-          </p:cNvSpPr>
-          <p:nvPr>
-            <p:ph type="title"/>
-          </p:nvPr>
-        </p:nvSpPr>
-        <p:spPr>
-          <a:xfrm>
-            <a:off x="311700" y="2150850"/>
-            <a:ext cx="8520600" cy="841800"/>
-          </a:xfrm>
-          <a:prstGeom prst="rect">
-            <a:avLst/>
-          </a:prstGeom>
-        </p:spPr>
-        <p:txBody>
-          <a:bodyPr spcFirstLastPara="1" wrap="square" lIns="91425" tIns="91425" rIns="91425" bIns="91425" anchor="ctr" anchorCtr="0">
-            <a:normAutofit/>
-          </a:bodyPr>
-          <a:lstStyle>
-            <a:lvl1pPr lvl="0" algn="ctr">
-              <a:spcBef>
-                <a:spcPts val="0"/>
-              </a:spcBef>
-              <a:spcAft>
-                <a:spcPts val="0"/>
-              </a:spcAft>
-              <a:buSzPts val="3600"/>
-              <a:buNone/>
-              <a:defRPr sz="3600"/>
-            </a:lvl1pPr>
-            <a:lvl2pPr lvl="1" algn="ctr">
-              <a:spcBef>
-                <a:spcPts val="0"/>
-              </a:spcBef>
-              <a:spcAft>
-                <a:spcPts val="0"/>
-              </a:spcAft>
-              <a:buSzPts val="3600"/>
-              <a:buNone/>
-              <a:defRPr sz="3600"/>
-            </a:lvl2pPr>
-            <a:lvl3pPr lvl="2" algn="ctr">
-              <a:spcBef>
-                <a:spcPts val="0"/>
-              </a:spcBef>
-              <a:spcAft>
-                <a:spcPts val="0"/>
-              </a:spcAft>
-              <a:buSzPts val="3600"/>
-              <a:buNone/>
-              <a:defRPr sz="3600"/>
-            </a:lvl3pPr>
-            <a:lvl4pPr lvl="3" algn="ctr">
-              <a:spcBef>
-                <a:spcPts val="0"/>
-              </a:spcBef>
-              <a:spcAft>
-                <a:spcPts val="0"/>
-              </a:spcAft>
-              <a:buSzPts val="3600"/>
-              <a:buNone/>
-              <a:defRPr sz="3600"/>
-            </a:lvl4pPr>
-            <a:lvl5pPr lvl="4" algn="ctr">
-              <a:spcBef>
-                <a:spcPts val="0"/>
-              </a:spcBef>
-              <a:spcAft>
-                <a:spcPts val="0"/>
-              </a:spcAft>
-              <a:buSzPts val="3600"/>
-              <a:buNone/>
-              <a:defRPr sz="3600"/>
-            </a:lvl5pPr>
-            <a:lvl6pPr lvl="5" algn="ctr">
-              <a:spcBef>
-                <a:spcPts val="0"/>
-              </a:spcBef>
-              <a:spcAft>
-                <a:spcPts val="0"/>
-              </a:spcAft>
-              <a:buSzPts val="3600"/>
-              <a:buNone/>
-              <a:defRPr sz="3600"/>
-            </a:lvl6pPr>
-            <a:lvl7pPr lvl="6" algn="ctr">
-              <a:spcBef>
-                <a:spcPts val="0"/>
-              </a:spcBef>
-              <a:spcAft>
-                <a:spcPts val="0"/>
-              </a:spcAft>
-              <a:buSzPts val="3600"/>
-              <a:buNone/>
-              <a:defRPr sz="3600"/>
-            </a:lvl7pPr>
-            <a:lvl8pPr lvl="7" algn="ctr">
-              <a:spcBef>
-                <a:spcPts val="0"/>
-              </a:spcBef>
-              <a:spcAft>
-                <a:spcPts val="0"/>
-              </a:spcAft>
-              <a:buSzPts val="3600"/>
-              <a:buNone/>
-              <a:defRPr sz="3600"/>
-            </a:lvl8pPr>
-            <a:lvl9pPr lvl="8" algn="ctr">
-              <a:spcBef>
-                <a:spcPts val="0"/>
-              </a:spcBef>
-              <a:spcAft>
-                <a:spcPts val="0"/>
-              </a:spcAft>
-              <a:buSzPts val="3600"/>
-              <a:buNone/>
-              <a:defRPr sz="3600"/>
-            </a:lvl9pPr>
-          </a:lstStyle>
-          <a:p>
-            <a:endParaRPr/>
-          </a:p>
-        </p:txBody>
-      </p:sp>
-      <p:sp>
-        <p:nvSpPr>
-          <p:cNvPr id="15" name="Google Shape;15;p3"/>
-          <p:cNvSpPr txBox="1">
-            <a:spLocks noGrp="1"/>
-          </p:cNvSpPr>
-          <p:nvPr>
-            <p:ph type="sldNum" idx="12"/>
-          </p:nvPr>
-        </p:nvSpPr>
-        <p:spPr>
-          <a:xfrm>
-            <a:off x="8472458" y="4663217"/>
-            <a:ext cx="548700" cy="393600"/>
-          </a:xfrm>
-          <a:prstGeom prst="rect">
-            <a:avLst/>
-          </a:prstGeom>
-        </p:spPr>
-        <p:txBody>
-          <a:bodyPr spcFirstLastPara="1" wrap="square" lIns="91425" tIns="91425" rIns="91425" bIns="91425" anchor="ctr" anchorCtr="0">
-            <a:normAutofit/>
-          </a:bodyPr>
-          <a:lstStyle>
-            <a:lvl1pPr lvl="0">
-              <a:buNone/>
-              <a:defRPr/>
-            </a:lvl1pPr>
-            <a:lvl2pPr lvl="1">
-              <a:buNone/>
-              <a:defRPr/>
-            </a:lvl2pPr>
-            <a:lvl3pPr lvl="2">
-              <a:buNone/>
-              <a:defRPr/>
-            </a:lvl3pPr>
-            <a:lvl4pPr lvl="3">
-              <a:buNone/>
-              <a:defRPr/>
-            </a:lvl4pPr>
-            <a:lvl5pPr lvl="4">
-              <a:buNone/>
-              <a:defRPr/>
-            </a:lvl5pPr>
-            <a:lvl6pPr lvl="5">
-              <a:buNone/>
-              <a:defRPr/>
-            </a:lvl6pPr>
-            <a:lvl7pPr lvl="6">
-              <a:buNone/>
-              <a:defRPr/>
-            </a:lvl7pPr>
-            <a:lvl8pPr lvl="7">
-              <a:buNone/>
-              <a:defRPr/>
-            </a:lvl8pPr>
-            <a:lvl9pPr lvl="8">
-              <a:buNone/>
-              <a:defRPr/>
-            </a:lvl9pPr>
-          </a:lstStyle>
-          <a:p>
-            <a:pPr marL="0" lvl="0" indent="0" algn="r" rtl="0">
-              <a:spcBef>
-                <a:spcPts val="0"/>
-              </a:spcBef>
-              <a:spcAft>
-                <a:spcPts val="0"/>
-              </a:spcAft>
-              <a:buNone/>
-            </a:pPr>
-            <a:fld id="{00000000-1234-1234-1234-123412341234}" type="slidenum">
-              <a:rPr lang="en"/>
-              <a:t>‹#›</a:t>
-            </a:fld>
-            <a:endParaRPr/>
-          </a:p>
-        </p:txBody>
-      </p:sp>
-    </p:spTree>
-  </p:cSld>
-  <p:clrMapOvr>
-    <a:masterClrMapping/>
-  </p:clrMapOvr>
-</p:sldLayout>
-</file>
-
-<file path=ppt/slideLayouts/slideLayout3.xml><?xml version="1.0" encoding="utf-8"?>
 <p:sldLayout xmlns:a="http://schemas.openxmlformats.org/drawingml/2006/main" xmlns:r="http://schemas.openxmlformats.org/officeDocument/2006/relationships" xmlns:p="http://schemas.openxmlformats.org/presentationml/2006/main" matchingName="Title and body" type="tx">
   <p:cSld name="TITLE_AND_BODY">
     <p:spTree>
@@ -3203,7 +2734,7 @@
 </p:sldLayout>
 </file>
 
-<file path=ppt/slideLayouts/slideLayout4.xml><?xml version="1.0" encoding="utf-8"?>
+<file path=ppt/slideLayouts/slideLayout3.xml><?xml version="1.0" encoding="utf-8"?>
 <p:sldLayout xmlns:a="http://schemas.openxmlformats.org/drawingml/2006/main" xmlns:r="http://schemas.openxmlformats.org/officeDocument/2006/relationships" xmlns:p="http://schemas.openxmlformats.org/presentationml/2006/main" matchingName="Title and two columns" type="twoColTx">
   <p:cSld name="TITLE_AND_TWO_COLUMNS">
     <p:spTree>
@@ -3694,7 +3225,7 @@
 </p:sldLayout>
 </file>
 
-<file path=ppt/slideLayouts/slideLayout5.xml><?xml version="1.0" encoding="utf-8"?>
+<file path=ppt/slideLayouts/slideLayout4.xml><?xml version="1.0" encoding="utf-8"?>
 <p:sldLayout xmlns:a="http://schemas.openxmlformats.org/drawingml/2006/main" xmlns:r="http://schemas.openxmlformats.org/officeDocument/2006/relationships" xmlns:p="http://schemas.openxmlformats.org/presentationml/2006/main" matchingName="Title only" type="titleOnly">
   <p:cSld name="TITLE_ONLY">
     <p:spTree>
@@ -3927,7 +3458,7 @@
 </p:sldLayout>
 </file>
 
-<file path=ppt/slideLayouts/slideLayout6.xml><?xml version="1.0" encoding="utf-8"?>
+<file path=ppt/slideLayouts/slideLayout5.xml><?xml version="1.0" encoding="utf-8"?>
 <p:sldLayout xmlns:a="http://schemas.openxmlformats.org/drawingml/2006/main" xmlns:r="http://schemas.openxmlformats.org/officeDocument/2006/relationships" xmlns:p="http://schemas.openxmlformats.org/presentationml/2006/main" matchingName="One column text">
   <p:cSld name="ONE_COLUMN_TEXT">
     <p:spTree>
@@ -4289,7 +3820,7 @@
 </p:sldLayout>
 </file>
 
-<file path=ppt/slideLayouts/slideLayout7.xml><?xml version="1.0" encoding="utf-8"?>
+<file path=ppt/slideLayouts/slideLayout6.xml><?xml version="1.0" encoding="utf-8"?>
 <p:sldLayout xmlns:a="http://schemas.openxmlformats.org/drawingml/2006/main" xmlns:r="http://schemas.openxmlformats.org/officeDocument/2006/relationships" xmlns:p="http://schemas.openxmlformats.org/presentationml/2006/main" matchingName="Main point">
   <p:cSld name="MAIN_POINT">
     <p:spTree>
@@ -4522,7 +4053,7 @@
 </p:sldLayout>
 </file>
 
-<file path=ppt/slideLayouts/slideLayout8.xml><?xml version="1.0" encoding="utf-8"?>
+<file path=ppt/slideLayouts/slideLayout7.xml><?xml version="1.0" encoding="utf-8"?>
 <p:sldLayout xmlns:a="http://schemas.openxmlformats.org/drawingml/2006/main" xmlns:r="http://schemas.openxmlformats.org/officeDocument/2006/relationships" xmlns:p="http://schemas.openxmlformats.org/presentationml/2006/main" matchingName="Section title and description">
   <p:cSld name="SECTION_TITLE_AND_DESCRIPTION">
     <p:spTree>
@@ -5080,7 +4611,7 @@
 </p:sldLayout>
 </file>
 
-<file path=ppt/slideLayouts/slideLayout9.xml><?xml version="1.0" encoding="utf-8"?>
+<file path=ppt/slideLayouts/slideLayout8.xml><?xml version="1.0" encoding="utf-8"?>
 <p:sldLayout xmlns:a="http://schemas.openxmlformats.org/drawingml/2006/main" xmlns:r="http://schemas.openxmlformats.org/officeDocument/2006/relationships" xmlns:p="http://schemas.openxmlformats.org/presentationml/2006/main" matchingName="Caption">
   <p:cSld name="CAPTION_ONLY">
     <p:spTree>
@@ -5144,6 +4675,370 @@
       <p:sp>
         <p:nvSpPr>
           <p:cNvPr id="43" name="Google Shape;43;p10"/>
+          <p:cNvSpPr txBox="1">
+            <a:spLocks noGrp="1"/>
+          </p:cNvSpPr>
+          <p:nvPr>
+            <p:ph type="sldNum" idx="12"/>
+          </p:nvPr>
+        </p:nvSpPr>
+        <p:spPr>
+          <a:xfrm>
+            <a:off x="8472458" y="4663217"/>
+            <a:ext cx="548700" cy="393600"/>
+          </a:xfrm>
+          <a:prstGeom prst="rect">
+            <a:avLst/>
+          </a:prstGeom>
+        </p:spPr>
+        <p:txBody>
+          <a:bodyPr spcFirstLastPara="1" wrap="square" lIns="91425" tIns="91425" rIns="91425" bIns="91425" anchor="ctr" anchorCtr="0">
+            <a:normAutofit/>
+          </a:bodyPr>
+          <a:lstStyle>
+            <a:lvl1pPr lvl="0">
+              <a:buNone/>
+              <a:defRPr/>
+            </a:lvl1pPr>
+            <a:lvl2pPr lvl="1">
+              <a:buNone/>
+              <a:defRPr/>
+            </a:lvl2pPr>
+            <a:lvl3pPr lvl="2">
+              <a:buNone/>
+              <a:defRPr/>
+            </a:lvl3pPr>
+            <a:lvl4pPr lvl="3">
+              <a:buNone/>
+              <a:defRPr/>
+            </a:lvl4pPr>
+            <a:lvl5pPr lvl="4">
+              <a:buNone/>
+              <a:defRPr/>
+            </a:lvl5pPr>
+            <a:lvl6pPr lvl="5">
+              <a:buNone/>
+              <a:defRPr/>
+            </a:lvl6pPr>
+            <a:lvl7pPr lvl="6">
+              <a:buNone/>
+              <a:defRPr/>
+            </a:lvl7pPr>
+            <a:lvl8pPr lvl="7">
+              <a:buNone/>
+              <a:defRPr/>
+            </a:lvl8pPr>
+            <a:lvl9pPr lvl="8">
+              <a:buNone/>
+              <a:defRPr/>
+            </a:lvl9pPr>
+          </a:lstStyle>
+          <a:p>
+            <a:pPr marL="0" lvl="0" indent="0" algn="r" rtl="0">
+              <a:spcBef>
+                <a:spcPts val="0"/>
+              </a:spcBef>
+              <a:spcAft>
+                <a:spcPts val="0"/>
+              </a:spcAft>
+              <a:buNone/>
+            </a:pPr>
+            <a:fld id="{00000000-1234-1234-1234-123412341234}" type="slidenum">
+              <a:rPr lang="en"/>
+              <a:t>‹#›</a:t>
+            </a:fld>
+            <a:endParaRPr/>
+          </a:p>
+        </p:txBody>
+      </p:sp>
+    </p:spTree>
+  </p:cSld>
+  <p:clrMapOvr>
+    <a:masterClrMapping/>
+  </p:clrMapOvr>
+</p:sldLayout>
+</file>
+
+<file path=ppt/slideLayouts/slideLayout9.xml><?xml version="1.0" encoding="utf-8"?>
+<p:sldLayout xmlns:a="http://schemas.openxmlformats.org/drawingml/2006/main" xmlns:r="http://schemas.openxmlformats.org/officeDocument/2006/relationships" xmlns:p="http://schemas.openxmlformats.org/presentationml/2006/main" matchingName="Big number">
+  <p:cSld name="BIG_NUMBER">
+    <p:spTree>
+      <p:nvGrpSpPr>
+        <p:cNvPr id="1" name="Shape 44"/>
+        <p:cNvGrpSpPr/>
+        <p:nvPr/>
+      </p:nvGrpSpPr>
+      <p:grpSpPr>
+        <a:xfrm>
+          <a:off x="0" y="0"/>
+          <a:ext cx="0" cy="0"/>
+          <a:chOff x="0" y="0"/>
+          <a:chExt cx="0" cy="0"/>
+        </a:xfrm>
+      </p:grpSpPr>
+      <p:sp>
+        <p:nvSpPr>
+          <p:cNvPr id="45" name="Google Shape;45;p11"/>
+          <p:cNvSpPr txBox="1">
+            <a:spLocks noGrp="1"/>
+          </p:cNvSpPr>
+          <p:nvPr>
+            <p:ph type="title" hasCustomPrompt="1"/>
+          </p:nvPr>
+        </p:nvSpPr>
+        <p:spPr>
+          <a:xfrm>
+            <a:off x="311700" y="1106125"/>
+            <a:ext cx="8520600" cy="1963500"/>
+          </a:xfrm>
+          <a:prstGeom prst="rect">
+            <a:avLst/>
+          </a:prstGeom>
+        </p:spPr>
+        <p:txBody>
+          <a:bodyPr spcFirstLastPara="1" wrap="square" lIns="91425" tIns="91425" rIns="91425" bIns="91425" anchor="b" anchorCtr="0">
+            <a:normAutofit/>
+          </a:bodyPr>
+          <a:lstStyle>
+            <a:lvl1pPr lvl="0" algn="ctr">
+              <a:spcBef>
+                <a:spcPts val="0"/>
+              </a:spcBef>
+              <a:spcAft>
+                <a:spcPts val="0"/>
+              </a:spcAft>
+              <a:buSzPts val="12000"/>
+              <a:buNone/>
+              <a:defRPr sz="12000"/>
+            </a:lvl1pPr>
+            <a:lvl2pPr lvl="1" algn="ctr">
+              <a:spcBef>
+                <a:spcPts val="0"/>
+              </a:spcBef>
+              <a:spcAft>
+                <a:spcPts val="0"/>
+              </a:spcAft>
+              <a:buSzPts val="12000"/>
+              <a:buNone/>
+              <a:defRPr sz="12000"/>
+            </a:lvl2pPr>
+            <a:lvl3pPr lvl="2" algn="ctr">
+              <a:spcBef>
+                <a:spcPts val="0"/>
+              </a:spcBef>
+              <a:spcAft>
+                <a:spcPts val="0"/>
+              </a:spcAft>
+              <a:buSzPts val="12000"/>
+              <a:buNone/>
+              <a:defRPr sz="12000"/>
+            </a:lvl3pPr>
+            <a:lvl4pPr lvl="3" algn="ctr">
+              <a:spcBef>
+                <a:spcPts val="0"/>
+              </a:spcBef>
+              <a:spcAft>
+                <a:spcPts val="0"/>
+              </a:spcAft>
+              <a:buSzPts val="12000"/>
+              <a:buNone/>
+              <a:defRPr sz="12000"/>
+            </a:lvl4pPr>
+            <a:lvl5pPr lvl="4" algn="ctr">
+              <a:spcBef>
+                <a:spcPts val="0"/>
+              </a:spcBef>
+              <a:spcAft>
+                <a:spcPts val="0"/>
+              </a:spcAft>
+              <a:buSzPts val="12000"/>
+              <a:buNone/>
+              <a:defRPr sz="12000"/>
+            </a:lvl5pPr>
+            <a:lvl6pPr lvl="5" algn="ctr">
+              <a:spcBef>
+                <a:spcPts val="0"/>
+              </a:spcBef>
+              <a:spcAft>
+                <a:spcPts val="0"/>
+              </a:spcAft>
+              <a:buSzPts val="12000"/>
+              <a:buNone/>
+              <a:defRPr sz="12000"/>
+            </a:lvl6pPr>
+            <a:lvl7pPr lvl="6" algn="ctr">
+              <a:spcBef>
+                <a:spcPts val="0"/>
+              </a:spcBef>
+              <a:spcAft>
+                <a:spcPts val="0"/>
+              </a:spcAft>
+              <a:buSzPts val="12000"/>
+              <a:buNone/>
+              <a:defRPr sz="12000"/>
+            </a:lvl7pPr>
+            <a:lvl8pPr lvl="7" algn="ctr">
+              <a:spcBef>
+                <a:spcPts val="0"/>
+              </a:spcBef>
+              <a:spcAft>
+                <a:spcPts val="0"/>
+              </a:spcAft>
+              <a:buSzPts val="12000"/>
+              <a:buNone/>
+              <a:defRPr sz="12000"/>
+            </a:lvl8pPr>
+            <a:lvl9pPr lvl="8" algn="ctr">
+              <a:spcBef>
+                <a:spcPts val="0"/>
+              </a:spcBef>
+              <a:spcAft>
+                <a:spcPts val="0"/>
+              </a:spcAft>
+              <a:buSzPts val="12000"/>
+              <a:buNone/>
+              <a:defRPr sz="12000"/>
+            </a:lvl9pPr>
+          </a:lstStyle>
+          <a:p>
+            <a:r>
+              <a:t>xx%</a:t>
+            </a:r>
+          </a:p>
+        </p:txBody>
+      </p:sp>
+      <p:sp>
+        <p:nvSpPr>
+          <p:cNvPr id="46" name="Google Shape;46;p11"/>
+          <p:cNvSpPr txBox="1">
+            <a:spLocks noGrp="1"/>
+          </p:cNvSpPr>
+          <p:nvPr>
+            <p:ph type="body" idx="1"/>
+          </p:nvPr>
+        </p:nvSpPr>
+        <p:spPr>
+          <a:xfrm>
+            <a:off x="311700" y="3152225"/>
+            <a:ext cx="8520600" cy="1300800"/>
+          </a:xfrm>
+          <a:prstGeom prst="rect">
+            <a:avLst/>
+          </a:prstGeom>
+        </p:spPr>
+        <p:txBody>
+          <a:bodyPr spcFirstLastPara="1" wrap="square" lIns="91425" tIns="91425" rIns="91425" bIns="91425" anchor="t" anchorCtr="0">
+            <a:normAutofit/>
+          </a:bodyPr>
+          <a:lstStyle>
+            <a:lvl1pPr marL="457200" lvl="0" indent="-342900" algn="ctr">
+              <a:spcBef>
+                <a:spcPts val="0"/>
+              </a:spcBef>
+              <a:spcAft>
+                <a:spcPts val="0"/>
+              </a:spcAft>
+              <a:buSzPts val="1800"/>
+              <a:buChar char="●"/>
+              <a:defRPr/>
+            </a:lvl1pPr>
+            <a:lvl2pPr marL="914400" lvl="1" indent="-317500" algn="ctr">
+              <a:spcBef>
+                <a:spcPts val="0"/>
+              </a:spcBef>
+              <a:spcAft>
+                <a:spcPts val="0"/>
+              </a:spcAft>
+              <a:buSzPts val="1400"/>
+              <a:buChar char="○"/>
+              <a:defRPr/>
+            </a:lvl2pPr>
+            <a:lvl3pPr marL="1371600" lvl="2" indent="-317500" algn="ctr">
+              <a:spcBef>
+                <a:spcPts val="0"/>
+              </a:spcBef>
+              <a:spcAft>
+                <a:spcPts val="0"/>
+              </a:spcAft>
+              <a:buSzPts val="1400"/>
+              <a:buChar char="■"/>
+              <a:defRPr/>
+            </a:lvl3pPr>
+            <a:lvl4pPr marL="1828800" lvl="3" indent="-317500" algn="ctr">
+              <a:spcBef>
+                <a:spcPts val="0"/>
+              </a:spcBef>
+              <a:spcAft>
+                <a:spcPts val="0"/>
+              </a:spcAft>
+              <a:buSzPts val="1400"/>
+              <a:buChar char="●"/>
+              <a:defRPr/>
+            </a:lvl4pPr>
+            <a:lvl5pPr marL="2286000" lvl="4" indent="-317500" algn="ctr">
+              <a:spcBef>
+                <a:spcPts val="0"/>
+              </a:spcBef>
+              <a:spcAft>
+                <a:spcPts val="0"/>
+              </a:spcAft>
+              <a:buSzPts val="1400"/>
+              <a:buChar char="○"/>
+              <a:defRPr/>
+            </a:lvl5pPr>
+            <a:lvl6pPr marL="2743200" lvl="5" indent="-317500" algn="ctr">
+              <a:spcBef>
+                <a:spcPts val="0"/>
+              </a:spcBef>
+              <a:spcAft>
+                <a:spcPts val="0"/>
+              </a:spcAft>
+              <a:buSzPts val="1400"/>
+              <a:buChar char="■"/>
+              <a:defRPr/>
+            </a:lvl6pPr>
+            <a:lvl7pPr marL="3200400" lvl="6" indent="-317500" algn="ctr">
+              <a:spcBef>
+                <a:spcPts val="0"/>
+              </a:spcBef>
+              <a:spcAft>
+                <a:spcPts val="0"/>
+              </a:spcAft>
+              <a:buSzPts val="1400"/>
+              <a:buChar char="●"/>
+              <a:defRPr/>
+            </a:lvl7pPr>
+            <a:lvl8pPr marL="3657600" lvl="7" indent="-317500" algn="ctr">
+              <a:spcBef>
+                <a:spcPts val="0"/>
+              </a:spcBef>
+              <a:spcAft>
+                <a:spcPts val="0"/>
+              </a:spcAft>
+              <a:buSzPts val="1400"/>
+              <a:buChar char="○"/>
+              <a:defRPr/>
+            </a:lvl8pPr>
+            <a:lvl9pPr marL="4114800" lvl="8" indent="-317500" algn="ctr">
+              <a:spcBef>
+                <a:spcPts val="0"/>
+              </a:spcBef>
+              <a:spcAft>
+                <a:spcPts val="0"/>
+              </a:spcAft>
+              <a:buSzPts val="1400"/>
+              <a:buChar char="■"/>
+              <a:defRPr/>
+            </a:lvl9pPr>
+          </a:lstStyle>
+          <a:p>
+            <a:endParaRPr/>
+          </a:p>
+        </p:txBody>
+      </p:sp>
+      <p:sp>
+        <p:nvSpPr>
+          <p:cNvPr id="47" name="Google Shape;47;p11"/>
           <p:cNvSpPr txBox="1">
             <a:spLocks noGrp="1"/>
           </p:cNvSpPr>
@@ -5796,16 +5691,15 @@
   <p:clrMap bg1="lt1" tx1="dk1" bg2="dk2" tx2="lt2" accent1="accent1" accent2="accent2" accent3="accent3" accent4="accent4" accent5="accent5" accent6="accent6" hlink="hlink" folHlink="folHlink"/>
   <p:sldLayoutIdLst>
     <p:sldLayoutId id="2147483648" r:id="rId1"/>
-    <p:sldLayoutId id="2147483649" r:id="rId2"/>
-    <p:sldLayoutId id="2147483650" r:id="rId3"/>
-    <p:sldLayoutId id="2147483651" r:id="rId4"/>
-    <p:sldLayoutId id="2147483652" r:id="rId5"/>
-    <p:sldLayoutId id="2147483653" r:id="rId6"/>
-    <p:sldLayoutId id="2147483654" r:id="rId7"/>
-    <p:sldLayoutId id="2147483655" r:id="rId8"/>
-    <p:sldLayoutId id="2147483656" r:id="rId9"/>
-    <p:sldLayoutId id="2147483657" r:id="rId10"/>
-    <p:sldLayoutId id="2147483658" r:id="rId11"/>
+    <p:sldLayoutId id="2147483650" r:id="rId2"/>
+    <p:sldLayoutId id="2147483651" r:id="rId3"/>
+    <p:sldLayoutId id="2147483652" r:id="rId4"/>
+    <p:sldLayoutId id="2147483653" r:id="rId5"/>
+    <p:sldLayoutId id="2147483654" r:id="rId6"/>
+    <p:sldLayoutId id="2147483655" r:id="rId7"/>
+    <p:sldLayoutId id="2147483656" r:id="rId8"/>
+    <p:sldLayoutId id="2147483657" r:id="rId9"/>
+    <p:sldLayoutId id="2147483658" r:id="rId10"/>
   </p:sldLayoutIdLst>
   <p:hf sldNum="0" hdr="0" ftr="0" dt="0"/>
   <p:txStyles>
@@ -6622,6 +6516,101 @@
   <p:cSld>
     <p:spTree>
       <p:nvGrpSpPr>
+        <p:cNvPr id="1" name="Shape 104"/>
+        <p:cNvGrpSpPr/>
+        <p:nvPr/>
+      </p:nvGrpSpPr>
+      <p:grpSpPr>
+        <a:xfrm>
+          <a:off x="0" y="0"/>
+          <a:ext cx="0" cy="0"/>
+          <a:chOff x="0" y="0"/>
+          <a:chExt cx="0" cy="0"/>
+        </a:xfrm>
+      </p:grpSpPr>
+      <p:sp>
+        <p:nvSpPr>
+          <p:cNvPr id="105" name="Google Shape;105;p21"/>
+          <p:cNvSpPr txBox="1">
+            <a:spLocks noGrp="1"/>
+          </p:cNvSpPr>
+          <p:nvPr>
+            <p:ph type="title"/>
+          </p:nvPr>
+        </p:nvSpPr>
+        <p:spPr>
+          <a:xfrm>
+            <a:off x="311700" y="445025"/>
+            <a:ext cx="8520600" cy="572700"/>
+          </a:xfrm>
+          <a:prstGeom prst="rect">
+            <a:avLst/>
+          </a:prstGeom>
+        </p:spPr>
+        <p:txBody>
+          <a:bodyPr spcFirstLastPara="1" wrap="square" lIns="91425" tIns="91425" rIns="91425" bIns="91425" anchor="t" anchorCtr="0">
+            <a:normAutofit fontScale="90000"/>
+          </a:bodyPr>
+          <a:lstStyle/>
+          <a:p>
+            <a:pPr marL="0" lvl="0" indent="0" algn="l" rtl="0">
+              <a:spcBef>
+                <a:spcPts val="0"/>
+              </a:spcBef>
+              <a:spcAft>
+                <a:spcPts val="0"/>
+              </a:spcAft>
+              <a:buNone/>
+            </a:pPr>
+            <a:r>
+              <a:rPr lang="en"/>
+              <a:t>Generic perceptual audio encoder</a:t>
+            </a:r>
+            <a:endParaRPr/>
+          </a:p>
+        </p:txBody>
+      </p:sp>
+      <p:pic>
+        <p:nvPicPr>
+          <p:cNvPr id="106" name="Google Shape;106;p21"/>
+          <p:cNvPicPr preferRelativeResize="0"/>
+          <p:nvPr/>
+        </p:nvPicPr>
+        <p:blipFill>
+          <a:blip r:embed="rId3">
+            <a:alphaModFix/>
+          </a:blip>
+          <a:stretch>
+            <a:fillRect/>
+          </a:stretch>
+        </p:blipFill>
+        <p:spPr>
+          <a:xfrm>
+            <a:off x="1142038" y="1488763"/>
+            <a:ext cx="6677025" cy="2905125"/>
+          </a:xfrm>
+          <a:prstGeom prst="rect">
+            <a:avLst/>
+          </a:prstGeom>
+          <a:noFill/>
+          <a:ln>
+            <a:noFill/>
+          </a:ln>
+        </p:spPr>
+      </p:pic>
+    </p:spTree>
+  </p:cSld>
+  <p:clrMapOvr>
+    <a:masterClrMapping/>
+  </p:clrMapOvr>
+</p:sld>
+</file>
+
+<file path=ppt/slides/slide11.xml><?xml version="1.0" encoding="utf-8"?>
+<p:sld xmlns:a="http://schemas.openxmlformats.org/drawingml/2006/main" xmlns:r="http://schemas.openxmlformats.org/officeDocument/2006/relationships" xmlns:p="http://schemas.openxmlformats.org/presentationml/2006/main">
+  <p:cSld>
+    <p:spTree>
+      <p:nvGrpSpPr>
         <p:cNvPr id="1" name="Shape 110"/>
         <p:cNvGrpSpPr/>
         <p:nvPr/>
@@ -6708,10 +6697,17 @@
               <a:buChar char="●"/>
             </a:pPr>
             <a:r>
-              <a:rPr lang="en"/>
+              <a:rPr lang="en" dirty="0"/>
               <a:t>Uncompressed audio as stored on an audio-CD has a bit rate of 1,411.2 kbit/s, (16 bit/sample × 44,100 samples/second × 2 channels / 1,000 bits/kilobit).</a:t>
             </a:r>
-            <a:endParaRPr/>
+            <a:endParaRPr dirty="0"/>
+          </a:p>
+          <a:p>
+            <a:pPr lvl="0"/>
+            <a:r>
+              <a:rPr lang="en" dirty="0"/>
+              <a:t> Perceptual codecs like MP3 achieve bit rates like 128, 160, and 192 kbit/s, representing compression ratios of approximately 11:1, 9:1 and 7:1 respectively.</a:t>
+            </a:r>
           </a:p>
           <a:p>
             <a:pPr marL="457200" lvl="0" indent="-342900" algn="l" rtl="0">
@@ -6725,10 +6721,18 @@
               <a:buChar char="●"/>
             </a:pPr>
             <a:r>
-              <a:rPr lang="en"/>
-              <a:t> Bit rates 128, 160, and 192 kbit/s, achieved with codecs like MP3, represent compression ratios of approximately 11:1, 9:1 and 7:1 respectively.</a:t>
-            </a:r>
-            <a:endParaRPr/>
+              <a:rPr lang="en" dirty="0"/>
+              <a:t>Neural audio codecs like </a:t>
+            </a:r>
+            <a:r>
+              <a:rPr lang="en" dirty="0" err="1"/>
+              <a:t>Encodec</a:t>
+            </a:r>
+            <a:r>
+              <a:rPr lang="en" dirty="0"/>
+              <a:t> reach bit rates of 1.5 to 24 kbit/s, representing compression ratios of approximately 940:1 to 60:1.</a:t>
+            </a:r>
+            <a:endParaRPr dirty="0"/>
           </a:p>
         </p:txBody>
       </p:sp>
@@ -6740,7 +6744,7 @@
 </p:sld>
 </file>
 
-<file path=ppt/slides/slide11.xml><?xml version="1.0" encoding="utf-8"?>
+<file path=ppt/slides/slide12.xml><?xml version="1.0" encoding="utf-8"?>
 <p:sld xmlns:a="http://schemas.openxmlformats.org/drawingml/2006/main" xmlns:r="http://schemas.openxmlformats.org/officeDocument/2006/relationships" xmlns:p="http://schemas.openxmlformats.org/presentationml/2006/main">
   <p:cSld>
     <p:spTree>
@@ -6898,6 +6902,102 @@
 </file>
 
 <file path=ppt/slides/slide2.xml><?xml version="1.0" encoding="utf-8"?>
+<p:sld xmlns:a="http://schemas.openxmlformats.org/drawingml/2006/main" xmlns:r="http://schemas.openxmlformats.org/officeDocument/2006/relationships" xmlns:p="http://schemas.openxmlformats.org/presentationml/2006/main">
+  <p:cSld>
+    <p:spTree>
+      <p:nvGrpSpPr>
+        <p:cNvPr id="1" name="Shape 59">
+          <a:extLst>
+            <a:ext uri="{FF2B5EF4-FFF2-40B4-BE49-F238E27FC236}">
+              <a16:creationId xmlns:a16="http://schemas.microsoft.com/office/drawing/2014/main" id="{AA080F64-D1BD-B8EA-2895-AA1036FCAB90}"/>
+            </a:ext>
+          </a:extLst>
+        </p:cNvPr>
+        <p:cNvGrpSpPr/>
+        <p:nvPr/>
+      </p:nvGrpSpPr>
+      <p:grpSpPr>
+        <a:xfrm>
+          <a:off x="0" y="0"/>
+          <a:ext cx="0" cy="0"/>
+          <a:chOff x="0" y="0"/>
+          <a:chExt cx="0" cy="0"/>
+        </a:xfrm>
+      </p:grpSpPr>
+      <p:sp>
+        <p:nvSpPr>
+          <p:cNvPr id="61" name="Google Shape;61;p14">
+            <a:extLst>
+              <a:ext uri="{FF2B5EF4-FFF2-40B4-BE49-F238E27FC236}">
+                <a16:creationId xmlns:a16="http://schemas.microsoft.com/office/drawing/2014/main" id="{8EA437D8-C76C-9B86-9817-A833300F4C8F}"/>
+              </a:ext>
+            </a:extLst>
+          </p:cNvPr>
+          <p:cNvSpPr txBox="1">
+            <a:spLocks noGrp="1"/>
+          </p:cNvSpPr>
+          <p:nvPr>
+            <p:ph type="body" idx="1"/>
+          </p:nvPr>
+        </p:nvSpPr>
+        <p:spPr>
+          <a:xfrm>
+            <a:off x="689429" y="522513"/>
+            <a:ext cx="7743372" cy="3955143"/>
+          </a:xfrm>
+          <a:prstGeom prst="rect">
+            <a:avLst/>
+          </a:prstGeom>
+        </p:spPr>
+        <p:txBody>
+          <a:bodyPr spcFirstLastPara="1" wrap="square" lIns="91425" tIns="91425" rIns="91425" bIns="91425" anchor="t" anchorCtr="0">
+            <a:normAutofit/>
+          </a:bodyPr>
+          <a:lstStyle/>
+          <a:p>
+            <a:pPr marL="0" lvl="0" indent="0" algn="l" rtl="0">
+              <a:lnSpc>
+                <a:spcPct val="150000"/>
+              </a:lnSpc>
+              <a:spcBef>
+                <a:spcPts val="0"/>
+              </a:spcBef>
+              <a:spcAft>
+                <a:spcPts val="0"/>
+              </a:spcAft>
+              <a:buSzPts val="1800"/>
+              <a:buNone/>
+            </a:pPr>
+            <a:r>
+              <a:rPr lang="en-US" sz="2000" dirty="0"/>
+              <a:t>Audio coding or audio compression algorithms are used to obtain compact digital representations of high-fidelity (wideband) audio signals for the purpose of efficient transmission or storage. The central objective in audio coding is to represent the signal with a minimum number of bits while achieving transparent signal reproduction, i.e., generating output audio that cannot be distinguished from the original input, even by a sensitive listener (“golden ears”). (</a:t>
+            </a:r>
+            <a:r>
+              <a:rPr lang="en-US" sz="2000" dirty="0" err="1"/>
+              <a:t>Spanias</a:t>
+            </a:r>
+            <a:r>
+              <a:rPr lang="en-US" sz="2000" dirty="0"/>
+              <a:t> et al., 2007)</a:t>
+            </a:r>
+            <a:endParaRPr sz="2000" dirty="0"/>
+          </a:p>
+        </p:txBody>
+      </p:sp>
+    </p:spTree>
+    <p:extLst>
+      <p:ext uri="{BB962C8B-B14F-4D97-AF65-F5344CB8AC3E}">
+        <p14:creationId xmlns:p14="http://schemas.microsoft.com/office/powerpoint/2010/main" val="1184376636"/>
+      </p:ext>
+    </p:extLst>
+  </p:cSld>
+  <p:clrMapOvr>
+    <a:masterClrMapping/>
+  </p:clrMapOvr>
+</p:sld>
+</file>
+
+<file path=ppt/slides/slide3.xml><?xml version="1.0" encoding="utf-8"?>
 <p:sld xmlns:a="http://schemas.openxmlformats.org/drawingml/2006/main" xmlns:r="http://schemas.openxmlformats.org/officeDocument/2006/relationships" xmlns:p="http://schemas.openxmlformats.org/presentationml/2006/main">
   <p:cSld>
     <p:spTree>
@@ -7070,7 +7170,7 @@
 </p:sld>
 </file>
 
-<file path=ppt/slides/slide3.xml><?xml version="1.0" encoding="utf-8"?>
+<file path=ppt/slides/slide4.xml><?xml version="1.0" encoding="utf-8"?>
 <p:sld xmlns:a="http://schemas.openxmlformats.org/drawingml/2006/main" xmlns:r="http://schemas.openxmlformats.org/officeDocument/2006/relationships" xmlns:p="http://schemas.openxmlformats.org/presentationml/2006/main">
   <p:cSld>
     <p:spTree>
@@ -7215,7 +7315,7 @@
             </a:pPr>
             <a:r>
               <a:rPr lang="en" dirty="0"/>
-              <a:t>fs =1/Ts , samples per second, units of fs are Hertz</a:t>
+              <a:t>fs =1/Ts, samples per second, units of fs are Hertz</a:t>
             </a:r>
             <a:endParaRPr dirty="0"/>
           </a:p>
@@ -7364,7 +7464,7 @@
 </p:sld>
 </file>
 
-<file path=ppt/slides/slide4.xml><?xml version="1.0" encoding="utf-8"?>
+<file path=ppt/slides/slide5.xml><?xml version="1.0" encoding="utf-8"?>
 <p:sld xmlns:a="http://schemas.openxmlformats.org/drawingml/2006/main" xmlns:r="http://schemas.openxmlformats.org/officeDocument/2006/relationships" xmlns:p="http://schemas.openxmlformats.org/presentationml/2006/main">
   <p:cSld>
     <p:spTree>
@@ -7574,7 +7674,7 @@
 </p:sld>
 </file>
 
-<file path=ppt/slides/slide5.xml><?xml version="1.0" encoding="utf-8"?>
+<file path=ppt/slides/slide6.xml><?xml version="1.0" encoding="utf-8"?>
 <p:sld xmlns:a="http://schemas.openxmlformats.org/drawingml/2006/main" xmlns:r="http://schemas.openxmlformats.org/officeDocument/2006/relationships" xmlns:p="http://schemas.openxmlformats.org/presentationml/2006/main">
   <p:cSld>
     <p:spTree>
@@ -7711,7 +7811,7 @@
 </p:sld>
 </file>
 
-<file path=ppt/slides/slide6.xml><?xml version="1.0" encoding="utf-8"?>
+<file path=ppt/slides/slide7.xml><?xml version="1.0" encoding="utf-8"?>
 <p:sld xmlns:a="http://schemas.openxmlformats.org/drawingml/2006/main" xmlns:r="http://schemas.openxmlformats.org/officeDocument/2006/relationships" xmlns:p="http://schemas.openxmlformats.org/presentationml/2006/main">
   <p:cSld>
     <p:spTree>
@@ -8033,7 +8133,7 @@
 </p:sld>
 </file>
 
-<file path=ppt/slides/slide7.xml><?xml version="1.0" encoding="utf-8"?>
+<file path=ppt/slides/slide8.xml><?xml version="1.0" encoding="utf-8"?>
 <p:sld xmlns:a="http://schemas.openxmlformats.org/drawingml/2006/main" xmlns:r="http://schemas.openxmlformats.org/officeDocument/2006/relationships" xmlns:p="http://schemas.openxmlformats.org/presentationml/2006/main">
   <p:cSld>
     <p:spTree>
@@ -8113,7 +8213,7 @@
         </p:spPr>
         <p:txBody>
           <a:bodyPr spcFirstLastPara="1" wrap="square" lIns="91425" tIns="91425" rIns="91425" bIns="91425" anchor="t" anchorCtr="0">
-            <a:normAutofit/>
+            <a:normAutofit fontScale="92500" lnSpcReduction="20000"/>
           </a:bodyPr>
           <a:lstStyle/>
           <a:p>
@@ -8133,7 +8233,19 @@
             </a:r>
             <a:r>
               <a:rPr lang="en" dirty="0"/>
-              <a:t> various perceptual assessment methods.</a:t>
+              <a:t> various perceptual assessment methods (ex. </a:t>
+            </a:r>
+            <a:r>
+              <a:rPr lang="en-US" dirty="0"/>
+              <a:t>n</a:t>
+            </a:r>
+            <a:r>
+              <a:rPr lang="en" dirty="0" err="1"/>
+              <a:t>oise</a:t>
+            </a:r>
+            <a:r>
+              <a:rPr lang="en" dirty="0"/>
+              <a:t>-to-mask ration, perceptual audio quality measure, perceptual evaluation, ..).</a:t>
             </a:r>
             <a:br>
               <a:rPr lang="en" dirty="0"/>
@@ -8181,7 +8293,15 @@
             </a:r>
             <a:r>
               <a:rPr lang="en" dirty="0"/>
-              <a:t>: related to real-time implementation.</a:t>
+              <a:t>: related to real-time implementation, measured in MIPS (mil</a:t>
+            </a:r>
+            <a:r>
+              <a:rPr lang="en-US" dirty="0"/>
+              <a:t>l</a:t>
+            </a:r>
+            <a:r>
+              <a:rPr lang="en" dirty="0"/>
+              <a:t>ions of instructions per second).</a:t>
             </a:r>
             <a:br>
               <a:rPr lang="en" dirty="0"/>
@@ -8213,7 +8333,15 @@
             </a:r>
             <a:r>
               <a:rPr lang="en" dirty="0"/>
-              <a:t> for network applications.</a:t>
+              <a:t> for network applications and 10-20 </a:t>
+            </a:r>
+            <a:r>
+              <a:rPr lang="en" dirty="0" err="1"/>
+              <a:t>ms</a:t>
+            </a:r>
+            <a:r>
+              <a:rPr lang="en" dirty="0"/>
+              <a:t> for two-way real-time communication.</a:t>
             </a:r>
             <a:br>
               <a:rPr lang="en" dirty="0"/>
@@ -8237,7 +8365,7 @@
             </a:r>
             <a:r>
               <a:rPr lang="en" dirty="0"/>
-              <a:t>: need to deal with noisy time-varying channels. </a:t>
+              <a:t>: need to deal with noisy time-varying channels, like for streaming audio over Internet. </a:t>
             </a:r>
             <a:endParaRPr dirty="0"/>
           </a:p>
@@ -8251,7 +8379,7 @@
 </p:sld>
 </file>
 
-<file path=ppt/slides/slide8.xml><?xml version="1.0" encoding="utf-8"?>
+<file path=ppt/slides/slide9.xml><?xml version="1.0" encoding="utf-8"?>
 <p:sld xmlns:a="http://schemas.openxmlformats.org/drawingml/2006/main" xmlns:r="http://schemas.openxmlformats.org/officeDocument/2006/relationships" xmlns:p="http://schemas.openxmlformats.org/presentationml/2006/main">
   <p:cSld>
     <p:spTree>
@@ -8445,101 +8573,6 @@
           </a:p>
         </p:txBody>
       </p:sp>
-    </p:spTree>
-  </p:cSld>
-  <p:clrMapOvr>
-    <a:masterClrMapping/>
-  </p:clrMapOvr>
-</p:sld>
-</file>
-
-<file path=ppt/slides/slide9.xml><?xml version="1.0" encoding="utf-8"?>
-<p:sld xmlns:a="http://schemas.openxmlformats.org/drawingml/2006/main" xmlns:r="http://schemas.openxmlformats.org/officeDocument/2006/relationships" xmlns:p="http://schemas.openxmlformats.org/presentationml/2006/main">
-  <p:cSld>
-    <p:spTree>
-      <p:nvGrpSpPr>
-        <p:cNvPr id="1" name="Shape 104"/>
-        <p:cNvGrpSpPr/>
-        <p:nvPr/>
-      </p:nvGrpSpPr>
-      <p:grpSpPr>
-        <a:xfrm>
-          <a:off x="0" y="0"/>
-          <a:ext cx="0" cy="0"/>
-          <a:chOff x="0" y="0"/>
-          <a:chExt cx="0" cy="0"/>
-        </a:xfrm>
-      </p:grpSpPr>
-      <p:sp>
-        <p:nvSpPr>
-          <p:cNvPr id="105" name="Google Shape;105;p21"/>
-          <p:cNvSpPr txBox="1">
-            <a:spLocks noGrp="1"/>
-          </p:cNvSpPr>
-          <p:nvPr>
-            <p:ph type="title"/>
-          </p:nvPr>
-        </p:nvSpPr>
-        <p:spPr>
-          <a:xfrm>
-            <a:off x="311700" y="445025"/>
-            <a:ext cx="8520600" cy="572700"/>
-          </a:xfrm>
-          <a:prstGeom prst="rect">
-            <a:avLst/>
-          </a:prstGeom>
-        </p:spPr>
-        <p:txBody>
-          <a:bodyPr spcFirstLastPara="1" wrap="square" lIns="91425" tIns="91425" rIns="91425" bIns="91425" anchor="t" anchorCtr="0">
-            <a:normAutofit fontScale="90000"/>
-          </a:bodyPr>
-          <a:lstStyle/>
-          <a:p>
-            <a:pPr marL="0" lvl="0" indent="0" algn="l" rtl="0">
-              <a:spcBef>
-                <a:spcPts val="0"/>
-              </a:spcBef>
-              <a:spcAft>
-                <a:spcPts val="0"/>
-              </a:spcAft>
-              <a:buNone/>
-            </a:pPr>
-            <a:r>
-              <a:rPr lang="en"/>
-              <a:t>Generic perceptual audio encoder</a:t>
-            </a:r>
-            <a:endParaRPr/>
-          </a:p>
-        </p:txBody>
-      </p:sp>
-      <p:pic>
-        <p:nvPicPr>
-          <p:cNvPr id="106" name="Google Shape;106;p21"/>
-          <p:cNvPicPr preferRelativeResize="0"/>
-          <p:nvPr/>
-        </p:nvPicPr>
-        <p:blipFill>
-          <a:blip r:embed="rId3">
-            <a:alphaModFix/>
-          </a:blip>
-          <a:stretch>
-            <a:fillRect/>
-          </a:stretch>
-        </p:blipFill>
-        <p:spPr>
-          <a:xfrm>
-            <a:off x="1142038" y="1488763"/>
-            <a:ext cx="6677025" cy="2905125"/>
-          </a:xfrm>
-          <a:prstGeom prst="rect">
-            <a:avLst/>
-          </a:prstGeom>
-          <a:noFill/>
-          <a:ln>
-            <a:noFill/>
-          </a:ln>
-        </p:spPr>
-      </p:pic>
     </p:spTree>
   </p:cSld>
   <p:clrMapOvr>

</xml_diff>